<commit_message>
More background + PDF export.
</commit_message>
<xml_diff>
--- a/slides/da2021-lecture-09.pptx
+++ b/slides/da2021-lecture-09.pptx
@@ -5,18 +5,20 @@
     <p:sldMasterId id="2147483648" r:id="rId1"/>
   </p:sldMasterIdLst>
   <p:notesMasterIdLst>
-    <p:notesMasterId r:id="rId8"/>
+    <p:notesMasterId r:id="rId10"/>
   </p:notesMasterIdLst>
   <p:handoutMasterIdLst>
-    <p:handoutMasterId r:id="rId9"/>
+    <p:handoutMasterId r:id="rId11"/>
   </p:handoutMasterIdLst>
   <p:sldIdLst>
     <p:sldId id="258" r:id="rId2"/>
-    <p:sldId id="264" r:id="rId3"/>
-    <p:sldId id="266" r:id="rId4"/>
-    <p:sldId id="265" r:id="rId5"/>
-    <p:sldId id="259" r:id="rId6"/>
-    <p:sldId id="261" r:id="rId7"/>
+    <p:sldId id="282" r:id="rId3"/>
+    <p:sldId id="267" r:id="rId4"/>
+    <p:sldId id="264" r:id="rId5"/>
+    <p:sldId id="266" r:id="rId6"/>
+    <p:sldId id="265" r:id="rId7"/>
+    <p:sldId id="259" r:id="rId8"/>
+    <p:sldId id="261" r:id="rId9"/>
   </p:sldIdLst>
   <p:sldSz cx="12192000" cy="6858000"/>
   <p:notesSz cx="6858000" cy="9144000"/>
@@ -243,7 +245,7 @@
           <a:p>
             <a:fld id="{24EFFC9C-04E4-E646-9E5F-B16BB383ECF2}" type="datetimeFigureOut">
               <a:rPr lang="en-US" smtClean="0"/>
-              <a:t>11/15/21</a:t>
+              <a:t>11/16/21</a:t>
             </a:fld>
             <a:endParaRPr lang="en-US"/>
           </a:p>
@@ -420,7 +422,7 @@
           <a:p>
             <a:fld id="{71795A92-54D0-5E4B-A08D-97789E42C8EA}" type="datetimeFigureOut">
               <a:rPr lang="en-US" smtClean="0"/>
-              <a:t>11/15/21</a:t>
+              <a:t>11/16/21</a:t>
             </a:fld>
             <a:endParaRPr lang="en-US"/>
           </a:p>
@@ -922,7 +924,7 @@
           <a:p>
             <a:fld id="{D1D074E6-BC95-7A40-8145-5D6390B81855}" type="datetimeFigureOut">
               <a:rPr lang="en-US" smtClean="0"/>
-              <a:t>11/15/21</a:t>
+              <a:t>11/16/21</a:t>
             </a:fld>
             <a:endParaRPr lang="en-US"/>
           </a:p>
@@ -1120,7 +1122,7 @@
           <a:p>
             <a:fld id="{D1D074E6-BC95-7A40-8145-5D6390B81855}" type="datetimeFigureOut">
               <a:rPr lang="en-US" smtClean="0"/>
-              <a:t>11/15/21</a:t>
+              <a:t>11/16/21</a:t>
             </a:fld>
             <a:endParaRPr lang="en-US"/>
           </a:p>
@@ -1328,7 +1330,7 @@
           <a:p>
             <a:fld id="{D1D074E6-BC95-7A40-8145-5D6390B81855}" type="datetimeFigureOut">
               <a:rPr lang="en-US" smtClean="0"/>
-              <a:t>11/15/21</a:t>
+              <a:t>11/16/21</a:t>
             </a:fld>
             <a:endParaRPr lang="en-US"/>
           </a:p>
@@ -1533,7 +1535,7 @@
           <a:p>
             <a:fld id="{D1D074E6-BC95-7A40-8145-5D6390B81855}" type="datetimeFigureOut">
               <a:rPr lang="en-US" smtClean="0"/>
-              <a:t>11/15/21</a:t>
+              <a:t>11/16/21</a:t>
             </a:fld>
             <a:endParaRPr lang="en-US"/>
           </a:p>
@@ -1686,7 +1688,7 @@
           <a:p>
             <a:fld id="{D1D074E6-BC95-7A40-8145-5D6390B81855}" type="datetimeFigureOut">
               <a:rPr lang="en-US" smtClean="0"/>
-              <a:t>11/15/21</a:t>
+              <a:t>11/16/21</a:t>
             </a:fld>
             <a:endParaRPr lang="en-US"/>
           </a:p>
@@ -1951,7 +1953,7 @@
           <a:p>
             <a:fld id="{D1D074E6-BC95-7A40-8145-5D6390B81855}" type="datetimeFigureOut">
               <a:rPr lang="en-US" smtClean="0"/>
-              <a:t>11/15/21</a:t>
+              <a:t>11/16/21</a:t>
             </a:fld>
             <a:endParaRPr lang="en-US"/>
           </a:p>
@@ -2363,7 +2365,7 @@
           <a:p>
             <a:fld id="{D1D074E6-BC95-7A40-8145-5D6390B81855}" type="datetimeFigureOut">
               <a:rPr lang="en-US" smtClean="0"/>
-              <a:t>11/15/21</a:t>
+              <a:t>11/16/21</a:t>
             </a:fld>
             <a:endParaRPr lang="en-US"/>
           </a:p>
@@ -2504,7 +2506,7 @@
           <a:p>
             <a:fld id="{D1D074E6-BC95-7A40-8145-5D6390B81855}" type="datetimeFigureOut">
               <a:rPr lang="en-US" smtClean="0"/>
-              <a:t>11/15/21</a:t>
+              <a:t>11/16/21</a:t>
             </a:fld>
             <a:endParaRPr lang="en-US"/>
           </a:p>
@@ -2617,7 +2619,7 @@
           <a:p>
             <a:fld id="{D1D074E6-BC95-7A40-8145-5D6390B81855}" type="datetimeFigureOut">
               <a:rPr lang="en-US" smtClean="0"/>
-              <a:t>11/15/21</a:t>
+              <a:t>11/16/21</a:t>
             </a:fld>
             <a:endParaRPr lang="en-US"/>
           </a:p>
@@ -2928,7 +2930,7 @@
           <a:p>
             <a:fld id="{D1D074E6-BC95-7A40-8145-5D6390B81855}" type="datetimeFigureOut">
               <a:rPr lang="en-US" smtClean="0"/>
-              <a:t>11/15/21</a:t>
+              <a:t>11/16/21</a:t>
             </a:fld>
             <a:endParaRPr lang="en-US"/>
           </a:p>
@@ -3216,7 +3218,7 @@
           <a:p>
             <a:fld id="{D1D074E6-BC95-7A40-8145-5D6390B81855}" type="datetimeFigureOut">
               <a:rPr lang="en-US" smtClean="0"/>
-              <a:t>11/15/21</a:t>
+              <a:t>11/16/21</a:t>
             </a:fld>
             <a:endParaRPr lang="en-US"/>
           </a:p>
@@ -3457,7 +3459,7 @@
           <a:p>
             <a:fld id="{D1D074E6-BC95-7A40-8145-5D6390B81855}" type="datetimeFigureOut">
               <a:rPr lang="en-US" smtClean="0"/>
-              <a:t>11/15/21</a:t>
+              <a:t>11/16/21</a:t>
             </a:fld>
             <a:endParaRPr lang="en-US"/>
           </a:p>
@@ -4600,6 +4602,397 @@
       </p:grpSpPr>
       <p:sp>
         <p:nvSpPr>
+          <p:cNvPr id="4" name="Title 3">
+            <a:extLst>
+              <a:ext uri="{FF2B5EF4-FFF2-40B4-BE49-F238E27FC236}">
+                <a16:creationId xmlns:a16="http://schemas.microsoft.com/office/drawing/2014/main" id="{CEB59E2F-E7C4-1C43-AF60-D37F90B6C7FD}"/>
+              </a:ext>
+            </a:extLst>
+          </p:cNvPr>
+          <p:cNvSpPr>
+            <a:spLocks noGrp="1"/>
+          </p:cNvSpPr>
+          <p:nvPr>
+            <p:ph type="title"/>
+          </p:nvPr>
+        </p:nvSpPr>
+        <p:spPr/>
+        <p:txBody>
+          <a:bodyPr/>
+          <a:lstStyle/>
+          <a:p>
+            <a:r>
+              <a:rPr lang="en-US" dirty="0"/>
+              <a:t>Can we automate</a:t>
+            </a:r>
+            <a:br>
+              <a:rPr lang="en-US" dirty="0"/>
+            </a:br>
+            <a:r>
+              <a:rPr lang="en-US" dirty="0"/>
+              <a:t>our own work?</a:t>
+            </a:r>
+          </a:p>
+        </p:txBody>
+      </p:sp>
+    </p:spTree>
+    <p:extLst>
+      <p:ext uri="{BB962C8B-B14F-4D97-AF65-F5344CB8AC3E}">
+        <p14:creationId xmlns:p14="http://schemas.microsoft.com/office/powerpoint/2010/main" val="846313000"/>
+      </p:ext>
+    </p:extLst>
+  </p:cSld>
+  <p:clrMapOvr>
+    <a:masterClrMapping/>
+  </p:clrMapOvr>
+</p:sld>
+</file>
+
+<file path=ppt/slides/slide3.xml><?xml version="1.0" encoding="utf-8"?>
+<p:sld xmlns:a="http://schemas.openxmlformats.org/drawingml/2006/main" xmlns:r="http://schemas.openxmlformats.org/officeDocument/2006/relationships" xmlns:p="http://schemas.openxmlformats.org/presentationml/2006/main">
+  <p:cSld>
+    <p:spTree>
+      <p:nvGrpSpPr>
+        <p:cNvPr id="1" name=""/>
+        <p:cNvGrpSpPr/>
+        <p:nvPr/>
+      </p:nvGrpSpPr>
+      <p:grpSpPr>
+        <a:xfrm>
+          <a:off x="0" y="0"/>
+          <a:ext cx="0" cy="0"/>
+          <a:chOff x="0" y="0"/>
+          <a:chExt cx="0" cy="0"/>
+        </a:xfrm>
+      </p:grpSpPr>
+      <p:sp>
+        <p:nvSpPr>
+          <p:cNvPr id="2" name="Title 1">
+            <a:extLst>
+              <a:ext uri="{FF2B5EF4-FFF2-40B4-BE49-F238E27FC236}">
+                <a16:creationId xmlns:a16="http://schemas.microsoft.com/office/drawing/2014/main" id="{C60DD5B2-5802-AA49-8D91-360D61F3C4D4}"/>
+              </a:ext>
+            </a:extLst>
+          </p:cNvPr>
+          <p:cNvSpPr>
+            <a:spLocks noGrp="1"/>
+          </p:cNvSpPr>
+          <p:nvPr>
+            <p:ph type="title"/>
+          </p:nvPr>
+        </p:nvSpPr>
+        <p:spPr/>
+        <p:txBody>
+          <a:bodyPr/>
+          <a:lstStyle/>
+          <a:p>
+            <a:r>
+              <a:rPr lang="en-FI" dirty="0"/>
+              <a:t>Meta-algorithmics</a:t>
+            </a:r>
+          </a:p>
+        </p:txBody>
+      </p:sp>
+      <p:sp>
+        <p:nvSpPr>
+          <p:cNvPr id="3" name="Content Placeholder 2">
+            <a:extLst>
+              <a:ext uri="{FF2B5EF4-FFF2-40B4-BE49-F238E27FC236}">
+                <a16:creationId xmlns:a16="http://schemas.microsoft.com/office/drawing/2014/main" id="{1E62F572-9E06-E849-818E-3B5484D54759}"/>
+              </a:ext>
+            </a:extLst>
+          </p:cNvPr>
+          <p:cNvSpPr>
+            <a:spLocks noGrp="1"/>
+          </p:cNvSpPr>
+          <p:nvPr>
+            <p:ph idx="1"/>
+          </p:nvPr>
+        </p:nvSpPr>
+        <p:spPr/>
+        <p:txBody>
+          <a:bodyPr/>
+          <a:lstStyle/>
+          <a:p>
+            <a:r>
+              <a:rPr lang="en-FI" b="1" dirty="0">
+                <a:latin typeface="Bernino Sans" pitchFamily="2" charset="77"/>
+              </a:rPr>
+              <a:t>Normal algorithms</a:t>
+            </a:r>
+            <a:r>
+              <a:rPr lang="en-US" dirty="0"/>
+              <a:t> — example:</a:t>
+            </a:r>
+            <a:endParaRPr lang="en-FI" b="1" dirty="0">
+              <a:latin typeface="Bernino Sans" pitchFamily="2" charset="77"/>
+            </a:endParaRPr>
+          </a:p>
+          <a:p>
+            <a:pPr lvl="1"/>
+            <a:r>
+              <a:rPr lang="en-FI" dirty="0"/>
+              <a:t>input: graph </a:t>
+            </a:r>
+            <a:r>
+              <a:rPr lang="en-FI" i="1" dirty="0"/>
+              <a:t>G</a:t>
+            </a:r>
+          </a:p>
+          <a:p>
+            <a:pPr lvl="1"/>
+            <a:r>
+              <a:rPr lang="en-FI" dirty="0"/>
+              <a:t>output: coloring of graph </a:t>
+            </a:r>
+            <a:r>
+              <a:rPr lang="en-FI" i="1" dirty="0"/>
+              <a:t>G</a:t>
+            </a:r>
+          </a:p>
+          <a:p>
+            <a:r>
+              <a:rPr lang="en-FI" b="1" dirty="0">
+                <a:latin typeface="Bernino Sans" pitchFamily="2" charset="77"/>
+              </a:rPr>
+              <a:t>Meta-algorithms</a:t>
+            </a:r>
+            <a:r>
+              <a:rPr lang="en-US" dirty="0"/>
+              <a:t> — example:</a:t>
+            </a:r>
+            <a:endParaRPr lang="en-FI" b="1" dirty="0">
+              <a:latin typeface="Bernino Sans" pitchFamily="2" charset="77"/>
+            </a:endParaRPr>
+          </a:p>
+          <a:p>
+            <a:pPr lvl="1"/>
+            <a:r>
+              <a:rPr lang="en-FI" dirty="0"/>
+              <a:t>input: </a:t>
+            </a:r>
+            <a:r>
+              <a:rPr lang="en-FI" b="1" i="1" dirty="0">
+                <a:solidFill>
+                  <a:schemeClr val="accent2"/>
+                </a:solidFill>
+                <a:latin typeface="Bernino Sans" pitchFamily="2" charset="77"/>
+              </a:rPr>
+              <a:t>computational problem </a:t>
+            </a:r>
+            <a:r>
+              <a:rPr lang="en-FI" i="1" dirty="0"/>
+              <a:t>P</a:t>
+            </a:r>
+          </a:p>
+          <a:p>
+            <a:pPr lvl="1"/>
+            <a:r>
+              <a:rPr lang="en-FI" dirty="0"/>
+              <a:t>output: </a:t>
+            </a:r>
+            <a:r>
+              <a:rPr lang="en-FI" b="1" i="1" dirty="0">
+                <a:solidFill>
+                  <a:schemeClr val="accent2"/>
+                </a:solidFill>
+                <a:latin typeface="Bernino Sans" pitchFamily="2" charset="77"/>
+              </a:rPr>
+              <a:t>algorithm</a:t>
+            </a:r>
+            <a:r>
+              <a:rPr lang="en-FI" dirty="0"/>
+              <a:t> for solving </a:t>
+            </a:r>
+            <a:r>
+              <a:rPr lang="en-FI" i="1" dirty="0"/>
+              <a:t>P</a:t>
+            </a:r>
+          </a:p>
+        </p:txBody>
+      </p:sp>
+      <p:sp>
+        <p:nvSpPr>
+          <p:cNvPr id="4" name="Rounded Rectangular Callout 3">
+            <a:extLst>
+              <a:ext uri="{FF2B5EF4-FFF2-40B4-BE49-F238E27FC236}">
+                <a16:creationId xmlns:a16="http://schemas.microsoft.com/office/drawing/2014/main" id="{47A33C4E-A227-374C-99BB-DBDBB29DCF64}"/>
+              </a:ext>
+            </a:extLst>
+          </p:cNvPr>
+          <p:cNvSpPr/>
+          <p:nvPr/>
+        </p:nvSpPr>
+        <p:spPr>
+          <a:xfrm>
+            <a:off x="8755380" y="3840480"/>
+            <a:ext cx="2926080" cy="2471420"/>
+          </a:xfrm>
+          <a:prstGeom prst="wedgeRoundRectCallout">
+            <a:avLst>
+              <a:gd name="adj1" fmla="val -64600"/>
+              <a:gd name="adj2" fmla="val -27871"/>
+              <a:gd name="adj3" fmla="val 16667"/>
+            </a:avLst>
+          </a:prstGeom>
+          <a:solidFill>
+            <a:schemeClr val="accent1"/>
+          </a:solidFill>
+          <a:ln>
+            <a:noFill/>
+          </a:ln>
+        </p:spPr>
+        <p:style>
+          <a:lnRef idx="2">
+            <a:schemeClr val="accent1">
+              <a:shade val="50000"/>
+            </a:schemeClr>
+          </a:lnRef>
+          <a:fillRef idx="1">
+            <a:schemeClr val="accent1"/>
+          </a:fillRef>
+          <a:effectRef idx="0">
+            <a:schemeClr val="accent1"/>
+          </a:effectRef>
+          <a:fontRef idx="minor">
+            <a:schemeClr val="lt1"/>
+          </a:fontRef>
+        </p:style>
+        <p:txBody>
+          <a:bodyPr rtlCol="0" anchor="ctr"/>
+          <a:lstStyle/>
+          <a:p>
+            <a:pPr algn="ctr"/>
+            <a:r>
+              <a:rPr lang="en-US" sz="3200" b="1" dirty="0">
+                <a:latin typeface="Bernino Sans Semibold" pitchFamily="2" charset="77"/>
+              </a:rPr>
+              <a:t>How to represent</a:t>
+            </a:r>
+            <a:br>
+              <a:rPr lang="en-US" sz="3200" b="1" dirty="0">
+                <a:latin typeface="Bernino Sans Semibold" pitchFamily="2" charset="77"/>
+              </a:rPr>
+            </a:br>
+            <a:r>
+              <a:rPr lang="en-US" sz="3200" b="1" dirty="0">
+                <a:latin typeface="Bernino Sans Semibold" pitchFamily="2" charset="77"/>
+              </a:rPr>
+              <a:t>problems or algorithms?</a:t>
+            </a:r>
+          </a:p>
+        </p:txBody>
+      </p:sp>
+    </p:spTree>
+    <p:extLst>
+      <p:ext uri="{BB962C8B-B14F-4D97-AF65-F5344CB8AC3E}">
+        <p14:creationId xmlns:p14="http://schemas.microsoft.com/office/powerpoint/2010/main" val="3717634627"/>
+      </p:ext>
+    </p:extLst>
+  </p:cSld>
+  <p:clrMapOvr>
+    <a:masterClrMapping/>
+  </p:clrMapOvr>
+  <p:timing>
+    <p:tnLst>
+      <p:par>
+        <p:cTn id="1" dur="indefinite" restart="never" nodeType="tmRoot">
+          <p:childTnLst>
+            <p:seq concurrent="1" nextAc="seek">
+              <p:cTn id="2" dur="indefinite" nodeType="mainSeq">
+                <p:childTnLst>
+                  <p:par>
+                    <p:cTn id="3" fill="hold">
+                      <p:stCondLst>
+                        <p:cond delay="indefinite"/>
+                      </p:stCondLst>
+                      <p:childTnLst>
+                        <p:par>
+                          <p:cTn id="4" fill="hold">
+                            <p:stCondLst>
+                              <p:cond delay="0"/>
+                            </p:stCondLst>
+                            <p:childTnLst>
+                              <p:par>
+                                <p:cTn id="5" presetID="1" presetClass="entr" presetSubtype="0" fill="hold" grpId="0" nodeType="clickEffect">
+                                  <p:stCondLst>
+                                    <p:cond delay="0"/>
+                                  </p:stCondLst>
+                                  <p:childTnLst>
+                                    <p:set>
+                                      <p:cBhvr>
+                                        <p:cTn id="6" dur="1" fill="hold">
+                                          <p:stCondLst>
+                                            <p:cond delay="0"/>
+                                          </p:stCondLst>
+                                        </p:cTn>
+                                        <p:tgtEl>
+                                          <p:spTgt spid="4"/>
+                                        </p:tgtEl>
+                                        <p:attrNameLst>
+                                          <p:attrName>style.visibility</p:attrName>
+                                        </p:attrNameLst>
+                                      </p:cBhvr>
+                                      <p:to>
+                                        <p:strVal val="visible"/>
+                                      </p:to>
+                                    </p:set>
+                                  </p:childTnLst>
+                                </p:cTn>
+                              </p:par>
+                            </p:childTnLst>
+                          </p:cTn>
+                        </p:par>
+                      </p:childTnLst>
+                    </p:cTn>
+                  </p:par>
+                </p:childTnLst>
+              </p:cTn>
+              <p:prevCondLst>
+                <p:cond evt="onPrev" delay="0">
+                  <p:tgtEl>
+                    <p:sldTgt/>
+                  </p:tgtEl>
+                </p:cond>
+              </p:prevCondLst>
+              <p:nextCondLst>
+                <p:cond evt="onNext" delay="0">
+                  <p:tgtEl>
+                    <p:sldTgt/>
+                  </p:tgtEl>
+                </p:cond>
+              </p:nextCondLst>
+            </p:seq>
+          </p:childTnLst>
+        </p:cTn>
+      </p:par>
+    </p:tnLst>
+    <p:bldLst>
+      <p:bldP spid="4" grpId="0" animBg="1"/>
+    </p:bldLst>
+  </p:timing>
+</p:sld>
+</file>
+
+<file path=ppt/slides/slide4.xml><?xml version="1.0" encoding="utf-8"?>
+<p:sld xmlns:a="http://schemas.openxmlformats.org/drawingml/2006/main" xmlns:r="http://schemas.openxmlformats.org/officeDocument/2006/relationships" xmlns:p="http://schemas.openxmlformats.org/presentationml/2006/main">
+  <p:cSld>
+    <p:spTree>
+      <p:nvGrpSpPr>
+        <p:cNvPr id="1" name=""/>
+        <p:cNvGrpSpPr/>
+        <p:nvPr/>
+      </p:nvGrpSpPr>
+      <p:grpSpPr>
+        <a:xfrm>
+          <a:off x="0" y="0"/>
+          <a:ext cx="0" cy="0"/>
+          <a:chOff x="0" y="0"/>
+          <a:chExt cx="0" cy="0"/>
+        </a:xfrm>
+      </p:grpSpPr>
+      <p:sp>
+        <p:nvSpPr>
           <p:cNvPr id="2" name="Title 1">
             <a:extLst>
               <a:ext uri="{FF2B5EF4-FFF2-40B4-BE49-F238E27FC236}">
@@ -4792,7 +5185,7 @@
 </p:sld>
 </file>
 
-<file path=ppt/slides/slide3.xml><?xml version="1.0" encoding="utf-8"?>
+<file path=ppt/slides/slide5.xml><?xml version="1.0" encoding="utf-8"?>
 <p:sld xmlns:a="http://schemas.openxmlformats.org/drawingml/2006/main" xmlns:r="http://schemas.openxmlformats.org/officeDocument/2006/relationships" xmlns:p="http://schemas.openxmlformats.org/presentationml/2006/main">
   <p:cSld>
     <p:spTree>
@@ -5160,7 +5553,7 @@
 </p:sld>
 </file>
 
-<file path=ppt/slides/slide4.xml><?xml version="1.0" encoding="utf-8"?>
+<file path=ppt/slides/slide6.xml><?xml version="1.0" encoding="utf-8"?>
 <p:sld xmlns:a="http://schemas.openxmlformats.org/drawingml/2006/main" xmlns:r="http://schemas.openxmlformats.org/officeDocument/2006/relationships" xmlns:p="http://schemas.openxmlformats.org/presentationml/2006/main">
   <p:cSld>
     <p:spTree>
@@ -5296,7 +5689,7 @@
 </p:sld>
 </file>
 
-<file path=ppt/slides/slide5.xml><?xml version="1.0" encoding="utf-8"?>
+<file path=ppt/slides/slide7.xml><?xml version="1.0" encoding="utf-8"?>
 <p:sld xmlns:a="http://schemas.openxmlformats.org/drawingml/2006/main" xmlns:r="http://schemas.openxmlformats.org/officeDocument/2006/relationships" xmlns:p="http://schemas.openxmlformats.org/presentationml/2006/main">
   <p:cSld>
     <p:spTree>
@@ -5356,7 +5749,7 @@
 </p:sld>
 </file>
 
-<file path=ppt/slides/slide6.xml><?xml version="1.0" encoding="utf-8"?>
+<file path=ppt/slides/slide8.xml><?xml version="1.0" encoding="utf-8"?>
 <p:sld xmlns:a="http://schemas.openxmlformats.org/drawingml/2006/main" xmlns:r="http://schemas.openxmlformats.org/officeDocument/2006/relationships" xmlns:p="http://schemas.openxmlformats.org/presentationml/2006/main">
   <p:cSld>
     <p:spTree>

</xml_diff>